<commit_message>
image object detection api 수정
</commit_message>
<xml_diff>
--- a/docs/순서도.pptx
+++ b/docs/순서도.pptx
@@ -218,7 +218,7 @@
           <a:p>
             <a:fld id="{FEBB53FF-EA0C-4AD8-8B3F-CE90C6A3C06E}" type="datetimeFigureOut">
               <a:rPr lang="ko-KR" altLang="en-US" smtClean="0"/>
-              <a:t>2022-07-17</a:t>
+              <a:t>2022-07-18</a:t>
             </a:fld>
             <a:endParaRPr lang="ko-KR" altLang="en-US"/>
           </a:p>
@@ -617,7 +617,7 @@
           <a:p>
             <a:fld id="{89A65DAD-E989-4FB0-8D33-7FCDDB457EB5}" type="datetimeFigureOut">
               <a:rPr lang="ko-KR" altLang="en-US" smtClean="0"/>
-              <a:t>2022-07-17</a:t>
+              <a:t>2022-07-18</a:t>
             </a:fld>
             <a:endParaRPr lang="ko-KR" altLang="en-US"/>
           </a:p>
@@ -787,7 +787,7 @@
           <a:p>
             <a:fld id="{89A65DAD-E989-4FB0-8D33-7FCDDB457EB5}" type="datetimeFigureOut">
               <a:rPr lang="ko-KR" altLang="en-US" smtClean="0"/>
-              <a:t>2022-07-17</a:t>
+              <a:t>2022-07-18</a:t>
             </a:fld>
             <a:endParaRPr lang="ko-KR" altLang="en-US"/>
           </a:p>
@@ -967,7 +967,7 @@
           <a:p>
             <a:fld id="{89A65DAD-E989-4FB0-8D33-7FCDDB457EB5}" type="datetimeFigureOut">
               <a:rPr lang="ko-KR" altLang="en-US" smtClean="0"/>
-              <a:t>2022-07-17</a:t>
+              <a:t>2022-07-18</a:t>
             </a:fld>
             <a:endParaRPr lang="ko-KR" altLang="en-US"/>
           </a:p>
@@ -1137,7 +1137,7 @@
           <a:p>
             <a:fld id="{89A65DAD-E989-4FB0-8D33-7FCDDB457EB5}" type="datetimeFigureOut">
               <a:rPr lang="ko-KR" altLang="en-US" smtClean="0"/>
-              <a:t>2022-07-17</a:t>
+              <a:t>2022-07-18</a:t>
             </a:fld>
             <a:endParaRPr lang="ko-KR" altLang="en-US"/>
           </a:p>
@@ -1383,7 +1383,7 @@
           <a:p>
             <a:fld id="{89A65DAD-E989-4FB0-8D33-7FCDDB457EB5}" type="datetimeFigureOut">
               <a:rPr lang="ko-KR" altLang="en-US" smtClean="0"/>
-              <a:t>2022-07-17</a:t>
+              <a:t>2022-07-18</a:t>
             </a:fld>
             <a:endParaRPr lang="ko-KR" altLang="en-US"/>
           </a:p>
@@ -1615,7 +1615,7 @@
           <a:p>
             <a:fld id="{89A65DAD-E989-4FB0-8D33-7FCDDB457EB5}" type="datetimeFigureOut">
               <a:rPr lang="ko-KR" altLang="en-US" smtClean="0"/>
-              <a:t>2022-07-17</a:t>
+              <a:t>2022-07-18</a:t>
             </a:fld>
             <a:endParaRPr lang="ko-KR" altLang="en-US"/>
           </a:p>
@@ -1982,7 +1982,7 @@
           <a:p>
             <a:fld id="{89A65DAD-E989-4FB0-8D33-7FCDDB457EB5}" type="datetimeFigureOut">
               <a:rPr lang="ko-KR" altLang="en-US" smtClean="0"/>
-              <a:t>2022-07-17</a:t>
+              <a:t>2022-07-18</a:t>
             </a:fld>
             <a:endParaRPr lang="ko-KR" altLang="en-US"/>
           </a:p>
@@ -2100,7 +2100,7 @@
           <a:p>
             <a:fld id="{89A65DAD-E989-4FB0-8D33-7FCDDB457EB5}" type="datetimeFigureOut">
               <a:rPr lang="ko-KR" altLang="en-US" smtClean="0"/>
-              <a:t>2022-07-17</a:t>
+              <a:t>2022-07-18</a:t>
             </a:fld>
             <a:endParaRPr lang="ko-KR" altLang="en-US"/>
           </a:p>
@@ -2195,7 +2195,7 @@
           <a:p>
             <a:fld id="{89A65DAD-E989-4FB0-8D33-7FCDDB457EB5}" type="datetimeFigureOut">
               <a:rPr lang="ko-KR" altLang="en-US" smtClean="0"/>
-              <a:t>2022-07-17</a:t>
+              <a:t>2022-07-18</a:t>
             </a:fld>
             <a:endParaRPr lang="ko-KR" altLang="en-US"/>
           </a:p>
@@ -2472,7 +2472,7 @@
           <a:p>
             <a:fld id="{89A65DAD-E989-4FB0-8D33-7FCDDB457EB5}" type="datetimeFigureOut">
               <a:rPr lang="ko-KR" altLang="en-US" smtClean="0"/>
-              <a:t>2022-07-17</a:t>
+              <a:t>2022-07-18</a:t>
             </a:fld>
             <a:endParaRPr lang="ko-KR" altLang="en-US"/>
           </a:p>
@@ -2725,7 +2725,7 @@
           <a:p>
             <a:fld id="{89A65DAD-E989-4FB0-8D33-7FCDDB457EB5}" type="datetimeFigureOut">
               <a:rPr lang="ko-KR" altLang="en-US" smtClean="0"/>
-              <a:t>2022-07-17</a:t>
+              <a:t>2022-07-18</a:t>
             </a:fld>
             <a:endParaRPr lang="ko-KR" altLang="en-US"/>
           </a:p>
@@ -2938,7 +2938,7 @@
           <a:p>
             <a:fld id="{89A65DAD-E989-4FB0-8D33-7FCDDB457EB5}" type="datetimeFigureOut">
               <a:rPr lang="ko-KR" altLang="en-US" smtClean="0"/>
-              <a:t>2022-07-17</a:t>
+              <a:t>2022-07-18</a:t>
             </a:fld>
             <a:endParaRPr lang="ko-KR" altLang="en-US"/>
           </a:p>
@@ -4817,19 +4817,7 @@
                           <a:ea typeface="+mn-ea"/>
                           <a:cs typeface="+mn-cs"/>
                         </a:rPr>
-                        <a:t>_{object}_{score}.</a:t>
-                      </a:r>
-                      <a:r>
-                        <a:rPr lang="en-US" altLang="ko-KR" sz="1100" kern="1200" dirty="0" smtClean="0">
-                          <a:solidFill>
-                            <a:schemeClr val="dk1"/>
-                          </a:solidFill>
-                          <a:effectLst/>
-                          <a:latin typeface="+mn-lt"/>
-                          <a:ea typeface="+mn-ea"/>
-                          <a:cs typeface="+mn-cs"/>
-                        </a:rPr>
-                        <a:t>jpg</a:t>
+                        <a:t>_{object}_{score}.jpg</a:t>
                       </a:r>
                     </a:p>
                     <a:p>
@@ -7528,17 +7516,12 @@
               <a:rPr lang="en-US" altLang="ko-KR" sz="1400" dirty="0" smtClean="0"/>
               <a:t>h264, mp4 </a:t>
             </a:r>
-            <a:endParaRPr lang="en-US" altLang="ko-KR" sz="1400" dirty="0" smtClean="0"/>
           </a:p>
           <a:p>
             <a:pPr algn="ctr"/>
             <a:r>
               <a:rPr lang="ko-KR" altLang="en-US" sz="1400" dirty="0" smtClean="0"/>
-              <a:t>영상 </a:t>
-            </a:r>
-            <a:r>
-              <a:rPr lang="ko-KR" altLang="en-US" sz="1400" dirty="0" smtClean="0"/>
-              <a:t>저장</a:t>
+              <a:t>영상 저장</a:t>
             </a:r>
             <a:endParaRPr lang="ko-KR" altLang="en-US" dirty="0"/>
           </a:p>
@@ -8528,15 +8511,7 @@
                   <a:srgbClr val="FF0000"/>
                 </a:solidFill>
               </a:rPr>
-              <a:t>객체 검출 </a:t>
-            </a:r>
-            <a:r>
-              <a:rPr lang="ko-KR" altLang="en-US" dirty="0" smtClean="0">
-                <a:solidFill>
-                  <a:srgbClr val="FF0000"/>
-                </a:solidFill>
-              </a:rPr>
-              <a:t>결과 </a:t>
+              <a:t>객체 검출 결과 </a:t>
             </a:r>
             <a:r>
               <a:rPr lang="en-US" altLang="ko-KR" dirty="0" smtClean="0">
@@ -8985,15 +8960,7 @@
                   <a:srgbClr val="FF0000"/>
                 </a:solidFill>
               </a:rPr>
-              <a:t>객체 검출 </a:t>
-            </a:r>
-            <a:r>
-              <a:rPr lang="ko-KR" altLang="en-US" dirty="0" smtClean="0">
-                <a:solidFill>
-                  <a:srgbClr val="FF0000"/>
-                </a:solidFill>
-              </a:rPr>
-              <a:t>결과 </a:t>
+              <a:t>객체 검출 결과 </a:t>
             </a:r>
             <a:r>
               <a:rPr lang="en-US" altLang="ko-KR" dirty="0" smtClean="0">

</xml_diff>